<commit_message>
Reverted to original menu and updated presentation
</commit_message>
<xml_diff>
--- a/Resources/Online Registration.pptx
+++ b/Resources/Online Registration.pptx
@@ -5947,7 +5947,7 @@
                                           </p:stCondLst>
                                         </p:cTn>
                                         <p:tgtEl>
-                                          <p:spTgt spid="5124"/>
+                                          <p:spTgt spid="5125"/>
                                         </p:tgtEl>
                                         <p:attrNameLst>
                                           <p:attrName>style.visibility</p:attrName>
@@ -5961,7 +5961,7 @@
                                       <p:cBhvr additive="base">
                                         <p:cTn id="7" dur="500" fill="hold"/>
                                         <p:tgtEl>
-                                          <p:spTgt spid="5124"/>
+                                          <p:spTgt spid="5125"/>
                                         </p:tgtEl>
                                         <p:attrNameLst>
                                           <p:attrName>ppt_x</p:attrName>
@@ -5984,7 +5984,7 @@
                                       <p:cBhvr additive="base">
                                         <p:cTn id="8" dur="500" fill="hold"/>
                                         <p:tgtEl>
-                                          <p:spTgt spid="5124"/>
+                                          <p:spTgt spid="5125"/>
                                         </p:tgtEl>
                                         <p:attrNameLst>
                                           <p:attrName>ppt_y</p:attrName>
@@ -6038,7 +6038,7 @@
                                           </p:stCondLst>
                                         </p:cTn>
                                         <p:tgtEl>
-                                          <p:spTgt spid="5125"/>
+                                          <p:spTgt spid="5126"/>
                                         </p:tgtEl>
                                         <p:attrNameLst>
                                           <p:attrName>style.visibility</p:attrName>
@@ -6052,7 +6052,7 @@
                                       <p:cBhvr additive="base">
                                         <p:cTn id="13" dur="500" fill="hold"/>
                                         <p:tgtEl>
-                                          <p:spTgt spid="5125"/>
+                                          <p:spTgt spid="5126"/>
                                         </p:tgtEl>
                                         <p:attrNameLst>
                                           <p:attrName>ppt_x</p:attrName>
@@ -6075,7 +6075,7 @@
                                       <p:cBhvr additive="base">
                                         <p:cTn id="14" dur="500" fill="hold"/>
                                         <p:tgtEl>
-                                          <p:spTgt spid="5125"/>
+                                          <p:spTgt spid="5126"/>
                                         </p:tgtEl>
                                         <p:attrNameLst>
                                           <p:attrName>ppt_y</p:attrName>
@@ -6129,7 +6129,7 @@
                                           </p:stCondLst>
                                         </p:cTn>
                                         <p:tgtEl>
-                                          <p:spTgt spid="5126"/>
+                                          <p:spTgt spid="5128"/>
                                         </p:tgtEl>
                                         <p:attrNameLst>
                                           <p:attrName>style.visibility</p:attrName>
@@ -6143,7 +6143,7 @@
                                       <p:cBhvr additive="base">
                                         <p:cTn id="19" dur="500" fill="hold"/>
                                         <p:tgtEl>
-                                          <p:spTgt spid="5126"/>
+                                          <p:spTgt spid="5128"/>
                                         </p:tgtEl>
                                         <p:attrNameLst>
                                           <p:attrName>ppt_x</p:attrName>
@@ -6166,7 +6166,7 @@
                                       <p:cBhvr additive="base">
                                         <p:cTn id="20" dur="500" fill="hold"/>
                                         <p:tgtEl>
-                                          <p:spTgt spid="5126"/>
+                                          <p:spTgt spid="5128"/>
                                         </p:tgtEl>
                                         <p:attrNameLst>
                                           <p:attrName>ppt_y</p:attrName>
@@ -6220,7 +6220,7 @@
                                           </p:stCondLst>
                                         </p:cTn>
                                         <p:tgtEl>
-                                          <p:spTgt spid="5128"/>
+                                          <p:spTgt spid="5129"/>
                                         </p:tgtEl>
                                         <p:attrNameLst>
                                           <p:attrName>style.visibility</p:attrName>
@@ -6233,97 +6233,6 @@
                                     <p:anim calcmode="lin" valueType="num">
                                       <p:cBhvr additive="base">
                                         <p:cTn id="25" dur="500" fill="hold"/>
-                                        <p:tgtEl>
-                                          <p:spTgt spid="5128"/>
-                                        </p:tgtEl>
-                                        <p:attrNameLst>
-                                          <p:attrName>ppt_x</p:attrName>
-                                        </p:attrNameLst>
-                                      </p:cBhvr>
-                                      <p:tavLst>
-                                        <p:tav tm="0">
-                                          <p:val>
-                                            <p:strVal val="#ppt_x"/>
-                                          </p:val>
-                                        </p:tav>
-                                        <p:tav tm="100000">
-                                          <p:val>
-                                            <p:strVal val="#ppt_x"/>
-                                          </p:val>
-                                        </p:tav>
-                                      </p:tavLst>
-                                    </p:anim>
-                                    <p:anim calcmode="lin" valueType="num">
-                                      <p:cBhvr additive="base">
-                                        <p:cTn id="26" dur="500" fill="hold"/>
-                                        <p:tgtEl>
-                                          <p:spTgt spid="5128"/>
-                                        </p:tgtEl>
-                                        <p:attrNameLst>
-                                          <p:attrName>ppt_y</p:attrName>
-                                        </p:attrNameLst>
-                                      </p:cBhvr>
-                                      <p:tavLst>
-                                        <p:tav tm="0">
-                                          <p:val>
-                                            <p:strVal val="1+#ppt_h/2"/>
-                                          </p:val>
-                                        </p:tav>
-                                        <p:tav tm="100000">
-                                          <p:val>
-                                            <p:strVal val="#ppt_y"/>
-                                          </p:val>
-                                        </p:tav>
-                                      </p:tavLst>
-                                    </p:anim>
-                                  </p:childTnLst>
-                                </p:cTn>
-                              </p:par>
-                            </p:childTnLst>
-                          </p:cTn>
-                        </p:par>
-                      </p:childTnLst>
-                    </p:cTn>
-                  </p:par>
-                  <p:par>
-                    <p:cTn id="27" fill="hold">
-                      <p:stCondLst>
-                        <p:cond delay="indefinite"/>
-                      </p:stCondLst>
-                      <p:childTnLst>
-                        <p:par>
-                          <p:cTn id="28" fill="hold">
-                            <p:stCondLst>
-                              <p:cond delay="0"/>
-                            </p:stCondLst>
-                            <p:childTnLst>
-                              <p:par>
-                                <p:cTn id="29" presetID="2" presetClass="entr" presetSubtype="4" fill="hold" nodeType="clickEffect">
-                                  <p:stCondLst>
-                                    <p:cond delay="0"/>
-                                  </p:stCondLst>
-                                  <p:childTnLst>
-                                    <p:set>
-                                      <p:cBhvr>
-                                        <p:cTn id="30" dur="1" fill="hold">
-                                          <p:stCondLst>
-                                            <p:cond delay="0"/>
-                                          </p:stCondLst>
-                                        </p:cTn>
-                                        <p:tgtEl>
-                                          <p:spTgt spid="5129"/>
-                                        </p:tgtEl>
-                                        <p:attrNameLst>
-                                          <p:attrName>style.visibility</p:attrName>
-                                        </p:attrNameLst>
-                                      </p:cBhvr>
-                                      <p:to>
-                                        <p:strVal val="visible"/>
-                                      </p:to>
-                                    </p:set>
-                                    <p:anim calcmode="lin" valueType="num">
-                                      <p:cBhvr additive="base">
-                                        <p:cTn id="31" dur="500" fill="hold"/>
                                         <p:tgtEl>
                                           <p:spTgt spid="5129"/>
                                         </p:tgtEl>
@@ -6346,7 +6255,7 @@
                                     </p:anim>
                                     <p:anim calcmode="lin" valueType="num">
                                       <p:cBhvr additive="base">
-                                        <p:cTn id="32" dur="500" fill="hold"/>
+                                        <p:cTn id="26" dur="500" fill="hold"/>
                                         <p:tgtEl>
                                           <p:spTgt spid="5129"/>
                                         </p:tgtEl>
@@ -6642,6 +6551,150 @@
           <a:noFill/>
         </p:spPr>
       </p:pic>
+      <p:sp>
+        <p:nvSpPr>
+          <p:cNvPr id="6" name="5-Point Star 5"/>
+          <p:cNvSpPr/>
+          <p:nvPr/>
+        </p:nvSpPr>
+        <p:spPr>
+          <a:xfrm>
+            <a:off x="7643834" y="1000108"/>
+            <a:ext cx="285752" cy="285752"/>
+          </a:xfrm>
+          <a:prstGeom prst="star5">
+            <a:avLst/>
+          </a:prstGeom>
+          <a:solidFill>
+            <a:srgbClr val="FFFF00"/>
+          </a:solidFill>
+          <a:ln w="3175">
+            <a:solidFill>
+              <a:schemeClr val="tx1"/>
+            </a:solidFill>
+          </a:ln>
+        </p:spPr>
+        <p:style>
+          <a:lnRef idx="2">
+            <a:schemeClr val="accent1">
+              <a:shade val="50000"/>
+            </a:schemeClr>
+          </a:lnRef>
+          <a:fillRef idx="1">
+            <a:schemeClr val="accent1"/>
+          </a:fillRef>
+          <a:effectRef idx="0">
+            <a:schemeClr val="accent1"/>
+          </a:effectRef>
+          <a:fontRef idx="minor">
+            <a:schemeClr val="lt1"/>
+          </a:fontRef>
+        </p:style>
+        <p:txBody>
+          <a:bodyPr rtlCol="0" anchor="ctr"/>
+          <a:lstStyle/>
+          <a:p>
+            <a:pPr algn="ctr"/>
+            <a:endParaRPr lang="en-GB"/>
+          </a:p>
+        </p:txBody>
+      </p:sp>
+      <p:sp>
+        <p:nvSpPr>
+          <p:cNvPr id="7" name="5-Point Star 6"/>
+          <p:cNvSpPr/>
+          <p:nvPr/>
+        </p:nvSpPr>
+        <p:spPr>
+          <a:xfrm>
+            <a:off x="7858148" y="1285860"/>
+            <a:ext cx="285752" cy="285752"/>
+          </a:xfrm>
+          <a:prstGeom prst="star5">
+            <a:avLst/>
+          </a:prstGeom>
+          <a:solidFill>
+            <a:srgbClr val="FFFF00"/>
+          </a:solidFill>
+          <a:ln w="3175">
+            <a:solidFill>
+              <a:schemeClr val="tx1"/>
+            </a:solidFill>
+          </a:ln>
+        </p:spPr>
+        <p:style>
+          <a:lnRef idx="2">
+            <a:schemeClr val="accent1">
+              <a:shade val="50000"/>
+            </a:schemeClr>
+          </a:lnRef>
+          <a:fillRef idx="1">
+            <a:schemeClr val="accent1"/>
+          </a:fillRef>
+          <a:effectRef idx="0">
+            <a:schemeClr val="accent1"/>
+          </a:effectRef>
+          <a:fontRef idx="minor">
+            <a:schemeClr val="lt1"/>
+          </a:fontRef>
+        </p:style>
+        <p:txBody>
+          <a:bodyPr rtlCol="0" anchor="ctr"/>
+          <a:lstStyle/>
+          <a:p>
+            <a:pPr algn="ctr"/>
+            <a:endParaRPr lang="en-GB"/>
+          </a:p>
+        </p:txBody>
+      </p:sp>
+      <p:sp>
+        <p:nvSpPr>
+          <p:cNvPr id="8" name="5-Point Star 7"/>
+          <p:cNvSpPr/>
+          <p:nvPr/>
+        </p:nvSpPr>
+        <p:spPr>
+          <a:xfrm>
+            <a:off x="7572396" y="1571612"/>
+            <a:ext cx="285752" cy="285752"/>
+          </a:xfrm>
+          <a:prstGeom prst="star5">
+            <a:avLst/>
+          </a:prstGeom>
+          <a:solidFill>
+            <a:srgbClr val="FFFF00"/>
+          </a:solidFill>
+          <a:ln w="3175">
+            <a:solidFill>
+              <a:schemeClr val="tx1"/>
+            </a:solidFill>
+          </a:ln>
+        </p:spPr>
+        <p:style>
+          <a:lnRef idx="2">
+            <a:schemeClr val="accent1">
+              <a:shade val="50000"/>
+            </a:schemeClr>
+          </a:lnRef>
+          <a:fillRef idx="1">
+            <a:schemeClr val="accent1"/>
+          </a:fillRef>
+          <a:effectRef idx="0">
+            <a:schemeClr val="accent1"/>
+          </a:effectRef>
+          <a:fontRef idx="minor">
+            <a:schemeClr val="lt1"/>
+          </a:fontRef>
+        </p:style>
+        <p:txBody>
+          <a:bodyPr rtlCol="0" anchor="ctr"/>
+          <a:lstStyle/>
+          <a:p>
+            <a:pPr algn="ctr"/>
+            <a:endParaRPr lang="en-GB"/>
+          </a:p>
+        </p:txBody>
+      </p:sp>
     </p:spTree>
   </p:cSld>
   <p:clrMapOvr>
@@ -6653,9 +6706,196 @@
   <p:timing>
     <p:tnLst>
       <p:par>
-        <p:cTn id="1" dur="indefinite" restart="never" nodeType="tmRoot"/>
+        <p:cTn id="1" dur="indefinite" restart="never" nodeType="tmRoot">
+          <p:childTnLst>
+            <p:seq concurrent="1" nextAc="seek">
+              <p:cTn id="2" dur="indefinite" nodeType="mainSeq">
+                <p:childTnLst>
+                  <p:par>
+                    <p:cTn id="3" fill="hold">
+                      <p:stCondLst>
+                        <p:cond delay="indefinite"/>
+                      </p:stCondLst>
+                      <p:childTnLst>
+                        <p:par>
+                          <p:cTn id="4" fill="hold">
+                            <p:stCondLst>
+                              <p:cond delay="0"/>
+                            </p:stCondLst>
+                            <p:childTnLst>
+                              <p:par>
+                                <p:cTn id="5" presetID="22" presetClass="entr" presetSubtype="4" fill="hold" grpId="0" nodeType="clickEffect">
+                                  <p:stCondLst>
+                                    <p:cond delay="0"/>
+                                  </p:stCondLst>
+                                  <p:childTnLst>
+                                    <p:set>
+                                      <p:cBhvr>
+                                        <p:cTn id="6" dur="1" fill="hold">
+                                          <p:stCondLst>
+                                            <p:cond delay="0"/>
+                                          </p:stCondLst>
+                                        </p:cTn>
+                                        <p:tgtEl>
+                                          <p:spTgt spid="6"/>
+                                        </p:tgtEl>
+                                        <p:attrNameLst>
+                                          <p:attrName>style.visibility</p:attrName>
+                                        </p:attrNameLst>
+                                      </p:cBhvr>
+                                      <p:to>
+                                        <p:strVal val="visible"/>
+                                      </p:to>
+                                    </p:set>
+                                    <p:animEffect transition="in" filter="wipe(down)">
+                                      <p:cBhvr>
+                                        <p:cTn id="7" dur="500"/>
+                                        <p:tgtEl>
+                                          <p:spTgt spid="6"/>
+                                        </p:tgtEl>
+                                      </p:cBhvr>
+                                    </p:animEffect>
+                                  </p:childTnLst>
+                                </p:cTn>
+                              </p:par>
+                            </p:childTnLst>
+                          </p:cTn>
+                        </p:par>
+                      </p:childTnLst>
+                    </p:cTn>
+                  </p:par>
+                  <p:par>
+                    <p:cTn id="8" fill="hold">
+                      <p:stCondLst>
+                        <p:cond delay="indefinite"/>
+                      </p:stCondLst>
+                      <p:childTnLst>
+                        <p:par>
+                          <p:cTn id="9" fill="hold">
+                            <p:stCondLst>
+                              <p:cond delay="0"/>
+                            </p:stCondLst>
+                            <p:childTnLst>
+                              <p:par>
+                                <p:cTn id="10" presetID="22" presetClass="entr" presetSubtype="4" fill="hold" grpId="0" nodeType="clickEffect">
+                                  <p:stCondLst>
+                                    <p:cond delay="0"/>
+                                  </p:stCondLst>
+                                  <p:childTnLst>
+                                    <p:set>
+                                      <p:cBhvr>
+                                        <p:cTn id="11" dur="1" fill="hold">
+                                          <p:stCondLst>
+                                            <p:cond delay="0"/>
+                                          </p:stCondLst>
+                                        </p:cTn>
+                                        <p:tgtEl>
+                                          <p:spTgt spid="7"/>
+                                        </p:tgtEl>
+                                        <p:attrNameLst>
+                                          <p:attrName>style.visibility</p:attrName>
+                                        </p:attrNameLst>
+                                      </p:cBhvr>
+                                      <p:to>
+                                        <p:strVal val="visible"/>
+                                      </p:to>
+                                    </p:set>
+                                    <p:animEffect transition="in" filter="wipe(down)">
+                                      <p:cBhvr>
+                                        <p:cTn id="12" dur="500"/>
+                                        <p:tgtEl>
+                                          <p:spTgt spid="7"/>
+                                        </p:tgtEl>
+                                      </p:cBhvr>
+                                    </p:animEffect>
+                                  </p:childTnLst>
+                                </p:cTn>
+                              </p:par>
+                            </p:childTnLst>
+                          </p:cTn>
+                        </p:par>
+                      </p:childTnLst>
+                    </p:cTn>
+                  </p:par>
+                  <p:par>
+                    <p:cTn id="13" fill="hold">
+                      <p:stCondLst>
+                        <p:cond delay="indefinite"/>
+                      </p:stCondLst>
+                      <p:childTnLst>
+                        <p:par>
+                          <p:cTn id="14" fill="hold">
+                            <p:stCondLst>
+                              <p:cond delay="0"/>
+                            </p:stCondLst>
+                            <p:childTnLst>
+                              <p:par>
+                                <p:cTn id="15" presetID="22" presetClass="entr" presetSubtype="4" fill="hold" grpId="0" nodeType="clickEffect">
+                                  <p:stCondLst>
+                                    <p:cond delay="0"/>
+                                  </p:stCondLst>
+                                  <p:childTnLst>
+                                    <p:set>
+                                      <p:cBhvr>
+                                        <p:cTn id="16" dur="1" fill="hold">
+                                          <p:stCondLst>
+                                            <p:cond delay="0"/>
+                                          </p:stCondLst>
+                                        </p:cTn>
+                                        <p:tgtEl>
+                                          <p:spTgt spid="8"/>
+                                        </p:tgtEl>
+                                        <p:attrNameLst>
+                                          <p:attrName>style.visibility</p:attrName>
+                                        </p:attrNameLst>
+                                      </p:cBhvr>
+                                      <p:to>
+                                        <p:strVal val="visible"/>
+                                      </p:to>
+                                    </p:set>
+                                    <p:animEffect transition="in" filter="wipe(down)">
+                                      <p:cBhvr>
+                                        <p:cTn id="17" dur="500"/>
+                                        <p:tgtEl>
+                                          <p:spTgt spid="8"/>
+                                        </p:tgtEl>
+                                      </p:cBhvr>
+                                    </p:animEffect>
+                                  </p:childTnLst>
+                                </p:cTn>
+                              </p:par>
+                            </p:childTnLst>
+                          </p:cTn>
+                        </p:par>
+                      </p:childTnLst>
+                    </p:cTn>
+                  </p:par>
+                </p:childTnLst>
+              </p:cTn>
+              <p:prevCondLst>
+                <p:cond evt="onPrev" delay="0">
+                  <p:tgtEl>
+                    <p:sldTgt/>
+                  </p:tgtEl>
+                </p:cond>
+              </p:prevCondLst>
+              <p:nextCondLst>
+                <p:cond evt="onNext" delay="0">
+                  <p:tgtEl>
+                    <p:sldTgt/>
+                  </p:tgtEl>
+                </p:cond>
+              </p:nextCondLst>
+            </p:seq>
+          </p:childTnLst>
+        </p:cTn>
       </p:par>
     </p:tnLst>
+    <p:bldLst>
+      <p:bldP spid="6" grpId="0" animBg="1"/>
+      <p:bldP spid="7" grpId="0" animBg="1"/>
+      <p:bldP spid="8" grpId="0" animBg="1"/>
+    </p:bldLst>
   </p:timing>
 </p:sld>
 </file>
@@ -6725,11 +6965,7 @@
           <a:p>
             <a:r>
               <a:rPr lang="en-ZA" sz="4400" dirty="0" smtClean="0"/>
-              <a:t>online </a:t>
-            </a:r>
-            <a:r>
-              <a:rPr lang="en-ZA" sz="4400" dirty="0" smtClean="0"/>
-              <a:t>registration discount</a:t>
+              <a:t>online registration discount</a:t>
             </a:r>
             <a:endParaRPr lang="en-GB" sz="4400" dirty="0"/>
           </a:p>
@@ -6916,7 +7152,7 @@
     <a:masterClrMapping/>
   </p:clrMapOvr>
   <p:transition>
-    <p:strips/>
+    <p:split orient="vert" dir="in"/>
   </p:transition>
   <p:timing>
     <p:tnLst>

</xml_diff>